<commit_message>
Adiciona link para video demo
</commit_message>
<xml_diff>
--- a/slides.pptx
+++ b/slides.pptx
@@ -7084,7 +7084,7 @@
         <p:spPr>
           <a:xfrm>
             <a:off x="3635853" y="3340375"/>
-            <a:ext cx="4261926" cy="276999"/>
+            <a:ext cx="4261926" cy="461665"/>
           </a:xfrm>
           <a:prstGeom prst="rect">
             <a:avLst/>
@@ -7097,7 +7097,6 @@
           </a:bodyPr>
           <a:lstStyle/>
           <a:p>
-            <a:pPr algn="ctr"/>
             <a:r>
               <a:rPr lang="en-US" sz="1200" dirty="0">
                 <a:solidFill>
@@ -7109,6 +7108,28 @@
                 <a:hlinkClick r:id="rId2"/>
               </a:rPr>
               <a:t>https://github.com/dados-mg/coda21-datapackage</a:t>
+            </a:r>
+            <a:endParaRPr lang="en-US" sz="1200" dirty="0">
+              <a:solidFill>
+                <a:srgbClr val="707070"/>
+              </a:solidFill>
+              <a:latin typeface="Montserrat" charset="0"/>
+              <a:ea typeface="Montserrat" charset="0"/>
+              <a:cs typeface="Montserrat" charset="0"/>
+            </a:endParaRPr>
+          </a:p>
+          <a:p>
+            <a:r>
+              <a:rPr lang="en-US" sz="1200" dirty="0">
+                <a:solidFill>
+                  <a:srgbClr val="707070"/>
+                </a:solidFill>
+                <a:latin typeface="Montserrat" charset="0"/>
+                <a:ea typeface="Montserrat" charset="0"/>
+                <a:cs typeface="Montserrat" charset="0"/>
+                <a:hlinkClick r:id="rId3"/>
+              </a:rPr>
+              <a:t>https://youtu.be/Q8tfYmYB7iw</a:t>
             </a:r>
             <a:endParaRPr lang="en-US" sz="1200" dirty="0">
               <a:solidFill>

</xml_diff>